<commit_message>
in class work 10-20-23
</commit_message>
<xml_diff>
--- a/workplace-communication/Persuasive-presentation.pptx
+++ b/workplace-communication/Persuasive-presentation.pptx
@@ -17,8 +17,11 @@
     <p:sldId id="267" r:id="rId11"/>
     <p:sldId id="268" r:id="rId12"/>
     <p:sldId id="269" r:id="rId13"/>
-    <p:sldId id="270" r:id="rId14"/>
-    <p:sldId id="272" r:id="rId15"/>
+    <p:sldId id="273" r:id="rId14"/>
+    <p:sldId id="274" r:id="rId15"/>
+    <p:sldId id="270" r:id="rId16"/>
+    <p:sldId id="272" r:id="rId17"/>
+    <p:sldId id="275" r:id="rId18"/>
   </p:sldIdLst>
   <p:sldSz cx="12192000" cy="6858000"/>
   <p:notesSz cx="6858000" cy="9144000"/>
@@ -129,6 +132,7 @@
 <p1510:revInfo xmlns:a="http://schemas.openxmlformats.org/drawingml/2006/main" xmlns:r="http://schemas.openxmlformats.org/officeDocument/2006/relationships" xmlns:p1510="http://schemas.microsoft.com/office/powerpoint/2015/10/main">
   <p1510:revLst>
     <p1510:client id="{474138D2-AA79-70B4-076C-51842CF89E75}" v="306" dt="2023-10-18T22:39:23.255"/>
+    <p1510:client id="{99937D58-AC91-31A8-89FF-1BF6AB9FCBEB}" v="75" dt="2023-10-20T11:36:03.570"/>
     <p1510:client id="{D7CD0586-03D3-4911-94EE-A43DFFB12773}" v="23" dt="2023-10-18T17:11:26.757"/>
   </p1510:revLst>
 </p1510:revInfo>
@@ -277,7 +281,7 @@
           <a:p>
             <a:fld id="{2395C5C9-164C-46B3-A87E-7660D39D3106}" type="datetime2">
               <a:rPr lang="en-US" smtClean="0"/>
-              <a:t>Thursday, October 19, 2023</a:t>
+              <a:t>Friday, October 20, 2023</a:t>
             </a:fld>
             <a:endParaRPr lang="en-US" dirty="0"/>
           </a:p>
@@ -480,7 +484,7 @@
           <a:p>
             <a:fld id="{5B75179A-1E2B-41AB-B400-4F1B4022FAEE}" type="datetime2">
               <a:rPr lang="en-US" smtClean="0"/>
-              <a:t>Thursday, October 19, 2023</a:t>
+              <a:t>Friday, October 20, 2023</a:t>
             </a:fld>
             <a:endParaRPr lang="en-US"/>
           </a:p>
@@ -693,7 +697,7 @@
           <a:p>
             <a:fld id="{05681D0F-6595-4F14-8EF3-954CD87C797B}" type="datetime2">
               <a:rPr lang="en-US" smtClean="0"/>
-              <a:t>Thursday, October 19, 2023</a:t>
+              <a:t>Friday, October 20, 2023</a:t>
             </a:fld>
             <a:endParaRPr lang="en-US"/>
           </a:p>
@@ -895,7 +899,7 @@
           <a:p>
             <a:fld id="{4DDCFF8A-AAF8-4A12-8A91-9CA0EAF6CBB9}" type="datetime2">
               <a:rPr lang="en-US" smtClean="0"/>
-              <a:t>Thursday, October 19, 2023</a:t>
+              <a:t>Friday, October 20, 2023</a:t>
             </a:fld>
             <a:endParaRPr lang="en-US" dirty="0"/>
           </a:p>
@@ -1174,7 +1178,7 @@
           <a:p>
             <a:fld id="{ABCC25C3-021A-4B0B-8F70-0C181FE1CF45}" type="datetime2">
               <a:rPr lang="en-US" smtClean="0"/>
-              <a:t>Thursday, October 19, 2023</a:t>
+              <a:t>Friday, October 20, 2023</a:t>
             </a:fld>
             <a:endParaRPr lang="en-US"/>
           </a:p>
@@ -1434,7 +1438,7 @@
           <a:p>
             <a:fld id="{0C23D88D-8CEC-4ED9-A53B-5596187D9A16}" type="datetime2">
               <a:rPr lang="en-US" smtClean="0"/>
-              <a:t>Thursday, October 19, 2023</a:t>
+              <a:t>Friday, October 20, 2023</a:t>
             </a:fld>
             <a:endParaRPr lang="en-US"/>
           </a:p>
@@ -1850,7 +1854,7 @@
           <a:p>
             <a:fld id="{D2CCD382-DFDA-4722-A27A-59C21AD112F2}" type="datetime2">
               <a:rPr lang="en-US" smtClean="0"/>
-              <a:t>Thursday, October 19, 2023</a:t>
+              <a:t>Friday, October 20, 2023</a:t>
             </a:fld>
             <a:endParaRPr lang="en-US"/>
           </a:p>
@@ -1995,7 +1999,7 @@
           <a:p>
             <a:fld id="{22F2A30D-1C09-413F-AAB1-38F366000715}" type="datetime2">
               <a:rPr lang="en-US" smtClean="0"/>
-              <a:t>Thursday, October 19, 2023</a:t>
+              <a:t>Friday, October 20, 2023</a:t>
             </a:fld>
             <a:endParaRPr lang="en-US"/>
           </a:p>
@@ -2117,7 +2121,7 @@
           <a:p>
             <a:fld id="{6DB82B9C-D65E-4F64-95C3-B10F3B00F0D9}" type="datetime2">
               <a:rPr lang="en-US" smtClean="0"/>
-              <a:t>Thursday, October 19, 2023</a:t>
+              <a:t>Friday, October 20, 2023</a:t>
             </a:fld>
             <a:endParaRPr lang="en-US"/>
           </a:p>
@@ -2440,7 +2444,7 @@
           <a:p>
             <a:fld id="{B7F5FDCC-6AAC-4A08-B9E0-3793AB5E64C3}" type="datetime2">
               <a:rPr lang="en-US" smtClean="0"/>
-              <a:t>Thursday, October 19, 2023</a:t>
+              <a:t>Friday, October 20, 2023</a:t>
             </a:fld>
             <a:endParaRPr lang="en-US"/>
           </a:p>
@@ -2728,7 +2732,7 @@
           <a:p>
             <a:fld id="{349FE94D-439C-40F1-900E-BC07940E3988}" type="datetime2">
               <a:rPr lang="en-US" smtClean="0"/>
-              <a:t>Thursday, October 19, 2023</a:t>
+              <a:t>Friday, October 20, 2023</a:t>
             </a:fld>
             <a:endParaRPr lang="en-US"/>
           </a:p>
@@ -3016,7 +3020,7 @@
           <a:p>
             <a:fld id="{8DEA2CF1-0EB2-4673-802D-3371233E4A77}" type="datetime2">
               <a:rPr lang="en-US" smtClean="0"/>
-              <a:t>Thursday, October 19, 2023</a:t>
+              <a:t>Friday, October 20, 2023</a:t>
             </a:fld>
             <a:endParaRPr lang="en-US" dirty="0"/>
           </a:p>
@@ -5192,6 +5196,154 @@
       </p:transition>
     </mc:Fallback>
   </mc:AlternateContent>
+  <p:timing>
+    <p:tnLst>
+      <p:par>
+        <p:cTn id="1" dur="indefinite" restart="never" nodeType="tmRoot">
+          <p:childTnLst>
+            <p:seq concurrent="1" nextAc="seek">
+              <p:cTn id="2" dur="indefinite" nodeType="mainSeq">
+                <p:childTnLst>
+                  <p:par>
+                    <p:cTn id="3" fill="hold">
+                      <p:stCondLst>
+                        <p:cond delay="indefinite"/>
+                      </p:stCondLst>
+                      <p:childTnLst>
+                        <p:par>
+                          <p:cTn id="4" fill="hold">
+                            <p:stCondLst>
+                              <p:cond delay="0"/>
+                            </p:stCondLst>
+                            <p:childTnLst>
+                              <p:par>
+                                <p:cTn id="5" presetID="16" presetClass="entr" presetSubtype="21" fill="hold" grpId="0" nodeType="clickEffect">
+                                  <p:stCondLst>
+                                    <p:cond delay="0"/>
+                                  </p:stCondLst>
+                                  <p:childTnLst>
+                                    <p:set>
+                                      <p:cBhvr>
+                                        <p:cTn id="6" dur="1" fill="hold">
+                                          <p:stCondLst>
+                                            <p:cond delay="0"/>
+                                          </p:stCondLst>
+                                        </p:cTn>
+                                        <p:tgtEl>
+                                          <p:spTgt spid="2"/>
+                                        </p:tgtEl>
+                                        <p:attrNameLst>
+                                          <p:attrName>style.visibility</p:attrName>
+                                        </p:attrNameLst>
+                                      </p:cBhvr>
+                                      <p:to>
+                                        <p:strVal val="visible"/>
+                                      </p:to>
+                                    </p:set>
+                                    <p:animEffect transition="in" filter="barn(inVertical)">
+                                      <p:cBhvr>
+                                        <p:cTn id="7" dur="500"/>
+                                        <p:tgtEl>
+                                          <p:spTgt spid="2"/>
+                                        </p:tgtEl>
+                                      </p:cBhvr>
+                                    </p:animEffect>
+                                  </p:childTnLst>
+                                </p:cTn>
+                              </p:par>
+                            </p:childTnLst>
+                          </p:cTn>
+                        </p:par>
+                      </p:childTnLst>
+                    </p:cTn>
+                  </p:par>
+                  <p:par>
+                    <p:cTn id="8" fill="hold">
+                      <p:stCondLst>
+                        <p:cond delay="indefinite"/>
+                      </p:stCondLst>
+                      <p:childTnLst>
+                        <p:par>
+                          <p:cTn id="9" fill="hold">
+                            <p:stCondLst>
+                              <p:cond delay="0"/>
+                            </p:stCondLst>
+                            <p:childTnLst>
+                              <p:par>
+                                <p:cTn id="10" presetID="10" presetClass="entr" presetSubtype="0" fill="hold" grpId="0" nodeType="clickEffect">
+                                  <p:stCondLst>
+                                    <p:cond delay="0"/>
+                                  </p:stCondLst>
+                                  <p:childTnLst>
+                                    <p:set>
+                                      <p:cBhvr>
+                                        <p:cTn id="11" dur="1" fill="hold">
+                                          <p:stCondLst>
+                                            <p:cond delay="0"/>
+                                          </p:stCondLst>
+                                        </p:cTn>
+                                        <p:tgtEl>
+                                          <p:spTgt spid="3">
+                                            <p:txEl>
+                                              <p:pRg st="0" end="0"/>
+                                            </p:txEl>
+                                          </p:spTgt>
+                                        </p:tgtEl>
+                                        <p:attrNameLst>
+                                          <p:attrName>style.visibility</p:attrName>
+                                        </p:attrNameLst>
+                                      </p:cBhvr>
+                                      <p:to>
+                                        <p:strVal val="visible"/>
+                                      </p:to>
+                                    </p:set>
+                                    <p:animEffect transition="in" filter="fade">
+                                      <p:cBhvr>
+                                        <p:cTn id="12" dur="500"/>
+                                        <p:tgtEl>
+                                          <p:spTgt spid="3">
+                                            <p:txEl>
+                                              <p:pRg st="0" end="0"/>
+                                            </p:txEl>
+                                          </p:spTgt>
+                                        </p:tgtEl>
+                                      </p:cBhvr>
+                                    </p:animEffect>
+                                  </p:childTnLst>
+                                </p:cTn>
+                              </p:par>
+                            </p:childTnLst>
+                          </p:cTn>
+                        </p:par>
+                      </p:childTnLst>
+                    </p:cTn>
+                  </p:par>
+                </p:childTnLst>
+              </p:cTn>
+              <p:prevCondLst>
+                <p:cond evt="onPrev" delay="0">
+                  <p:tgtEl>
+                    <p:sldTgt/>
+                  </p:tgtEl>
+                </p:cond>
+              </p:prevCondLst>
+              <p:nextCondLst>
+                <p:cond evt="onNext" delay="0">
+                  <p:tgtEl>
+                    <p:sldTgt/>
+                  </p:tgtEl>
+                </p:cond>
+              </p:nextCondLst>
+            </p:seq>
+          </p:childTnLst>
+        </p:cTn>
+      </p:par>
+    </p:tnLst>
+    <p:bldLst>
+      <p:bldP spid="2" grpId="0"/>
+      <p:bldP spid="3" grpId="0" build="p"/>
+    </p:bldLst>
+  </p:timing>
 </p:sld>
 </file>
 
@@ -6159,6 +6311,18 @@
   <p:clrMapOvr>
     <a:masterClrMapping/>
   </p:clrMapOvr>
+  <mc:AlternateContent xmlns:mc="http://schemas.openxmlformats.org/markup-compatibility/2006">
+    <mc:Choice xmlns:p14="http://schemas.microsoft.com/office/powerpoint/2010/main" Requires="p14">
+      <p:transition spd="slow" p14:dur="1500">
+        <p:random/>
+      </p:transition>
+    </mc:Choice>
+    <mc:Fallback>
+      <p:transition spd="slow">
+        <p:random/>
+      </p:transition>
+    </mc:Fallback>
+  </mc:AlternateContent>
 </p:sld>
 </file>
 
@@ -7825,6 +7989,18 @@
   <p:clrMapOvr>
     <a:masterClrMapping/>
   </p:clrMapOvr>
+  <mc:AlternateContent xmlns:mc="http://schemas.openxmlformats.org/markup-compatibility/2006">
+    <mc:Choice xmlns:p14="http://schemas.microsoft.com/office/powerpoint/2010/main" Requires="p14">
+      <p:transition spd="slow" p14:dur="1500">
+        <p:random/>
+      </p:transition>
+    </mc:Choice>
+    <mc:Fallback>
+      <p:transition spd="slow">
+        <p:random/>
+      </p:transition>
+    </mc:Fallback>
+  </mc:AlternateContent>
 </p:sld>
 </file>
 
@@ -8114,10 +8290,170 @@
   <p:clrMapOvr>
     <a:masterClrMapping/>
   </p:clrMapOvr>
+  <mc:AlternateContent xmlns:mc="http://schemas.openxmlformats.org/markup-compatibility/2006">
+    <mc:Choice xmlns:p14="http://schemas.microsoft.com/office/powerpoint/2010/main" Requires="p14">
+      <p:transition spd="slow" p14:dur="1500">
+        <p:random/>
+      </p:transition>
+    </mc:Choice>
+    <mc:Fallback>
+      <p:transition spd="slow">
+        <p:random/>
+      </p:transition>
+    </mc:Fallback>
+  </mc:AlternateContent>
 </p:sld>
 </file>
 
 <file path=ppt/slides/slide13.xml><?xml version="1.0" encoding="utf-8"?>
+<p:sld xmlns:a="http://schemas.openxmlformats.org/drawingml/2006/main" xmlns:r="http://schemas.openxmlformats.org/officeDocument/2006/relationships" xmlns:p="http://schemas.openxmlformats.org/presentationml/2006/main">
+  <p:cSld>
+    <p:bg>
+      <p:bgPr>
+        <a:solidFill>
+          <a:schemeClr val="tx1"/>
+        </a:solidFill>
+        <a:effectLst/>
+      </p:bgPr>
+    </p:bg>
+    <p:spTree>
+      <p:nvGrpSpPr>
+        <p:cNvPr id="1" name=""/>
+        <p:cNvGrpSpPr/>
+        <p:nvPr/>
+      </p:nvGrpSpPr>
+      <p:grpSpPr>
+        <a:xfrm>
+          <a:off x="0" y="0"/>
+          <a:ext cx="0" cy="0"/>
+          <a:chOff x="0" y="0"/>
+          <a:chExt cx="0" cy="0"/>
+        </a:xfrm>
+      </p:grpSpPr>
+      <p:pic>
+        <p:nvPicPr>
+          <p:cNvPr id="2" name="Picture 1" descr="A white background with black text&#10;&#10;Description automatically generated">
+            <a:extLst>
+              <a:ext uri="{FF2B5EF4-FFF2-40B4-BE49-F238E27FC236}">
+                <a16:creationId xmlns:a16="http://schemas.microsoft.com/office/drawing/2014/main" id="{DACAA6C1-23E5-8635-67AD-2AD0E50171F5}"/>
+              </a:ext>
+            </a:extLst>
+          </p:cNvPr>
+          <p:cNvPicPr>
+            <a:picLocks noChangeAspect="1"/>
+          </p:cNvPicPr>
+          <p:nvPr/>
+        </p:nvPicPr>
+        <p:blipFill>
+          <a:blip r:embed="rId2"/>
+          <a:stretch>
+            <a:fillRect/>
+          </a:stretch>
+        </p:blipFill>
+        <p:spPr>
+          <a:xfrm>
+            <a:off x="-58152" y="-387953"/>
+            <a:ext cx="12248146" cy="7553696"/>
+          </a:xfrm>
+          <a:prstGeom prst="rect">
+            <a:avLst/>
+          </a:prstGeom>
+        </p:spPr>
+      </p:pic>
+    </p:spTree>
+    <p:extLst>
+      <p:ext uri="{BB962C8B-B14F-4D97-AF65-F5344CB8AC3E}">
+        <p14:creationId xmlns:p14="http://schemas.microsoft.com/office/powerpoint/2010/main" val="654312875"/>
+      </p:ext>
+    </p:extLst>
+  </p:cSld>
+  <p:clrMapOvr>
+    <a:masterClrMapping/>
+  </p:clrMapOvr>
+  <mc:AlternateContent xmlns:mc="http://schemas.openxmlformats.org/markup-compatibility/2006">
+    <mc:Choice xmlns:p14="http://schemas.microsoft.com/office/powerpoint/2010/main" Requires="p14">
+      <p:transition spd="slow" p14:dur="1500">
+        <p:random/>
+      </p:transition>
+    </mc:Choice>
+    <mc:Fallback>
+      <p:transition spd="slow">
+        <p:random/>
+      </p:transition>
+    </mc:Fallback>
+  </mc:AlternateContent>
+</p:sld>
+</file>
+
+<file path=ppt/slides/slide14.xml><?xml version="1.0" encoding="utf-8"?>
+<p:sld xmlns:a="http://schemas.openxmlformats.org/drawingml/2006/main" xmlns:r="http://schemas.openxmlformats.org/officeDocument/2006/relationships" xmlns:p="http://schemas.openxmlformats.org/presentationml/2006/main">
+  <p:cSld>
+    <p:bg>
+      <p:bgPr>
+        <a:solidFill>
+          <a:schemeClr val="tx1"/>
+        </a:solidFill>
+        <a:effectLst/>
+      </p:bgPr>
+    </p:bg>
+    <p:spTree>
+      <p:nvGrpSpPr>
+        <p:cNvPr id="1" name=""/>
+        <p:cNvGrpSpPr/>
+        <p:nvPr/>
+      </p:nvGrpSpPr>
+      <p:grpSpPr>
+        <a:xfrm>
+          <a:off x="0" y="0"/>
+          <a:ext cx="0" cy="0"/>
+          <a:chOff x="0" y="0"/>
+          <a:chExt cx="0" cy="0"/>
+        </a:xfrm>
+      </p:grpSpPr>
+      <p:pic>
+        <p:nvPicPr>
+          <p:cNvPr id="2" name="Picture 1" descr="A white text on a white background&#10;&#10;Description automatically generated">
+            <a:extLst>
+              <a:ext uri="{FF2B5EF4-FFF2-40B4-BE49-F238E27FC236}">
+                <a16:creationId xmlns:a16="http://schemas.microsoft.com/office/drawing/2014/main" id="{6AFA0BAD-1EC0-C647-1B50-DE4F362010D7}"/>
+              </a:ext>
+            </a:extLst>
+          </p:cNvPr>
+          <p:cNvPicPr>
+            <a:picLocks noChangeAspect="1"/>
+          </p:cNvPicPr>
+          <p:nvPr/>
+        </p:nvPicPr>
+        <p:blipFill>
+          <a:blip r:embed="rId2"/>
+          <a:stretch>
+            <a:fillRect/>
+          </a:stretch>
+        </p:blipFill>
+        <p:spPr>
+          <a:xfrm>
+            <a:off x="-78204" y="3072"/>
+            <a:ext cx="12268198" cy="7543670"/>
+          </a:xfrm>
+          <a:prstGeom prst="rect">
+            <a:avLst/>
+          </a:prstGeom>
+        </p:spPr>
+      </p:pic>
+    </p:spTree>
+    <p:extLst>
+      <p:ext uri="{BB962C8B-B14F-4D97-AF65-F5344CB8AC3E}">
+        <p14:creationId xmlns:p14="http://schemas.microsoft.com/office/powerpoint/2010/main" val="422306755"/>
+      </p:ext>
+    </p:extLst>
+  </p:cSld>
+  <p:clrMapOvr>
+    <a:masterClrMapping/>
+  </p:clrMapOvr>
+</p:sld>
+</file>
+
+<file path=ppt/slides/slide15.xml><?xml version="1.0" encoding="utf-8"?>
 <p:sld xmlns:a="http://schemas.openxmlformats.org/drawingml/2006/main" xmlns:r="http://schemas.openxmlformats.org/officeDocument/2006/relationships" xmlns:p="http://schemas.openxmlformats.org/presentationml/2006/main">
   <p:cSld>
     <p:bg>
@@ -9119,10 +9455,22 @@
   <p:clrMapOvr>
     <a:masterClrMapping/>
   </p:clrMapOvr>
+  <mc:AlternateContent xmlns:mc="http://schemas.openxmlformats.org/markup-compatibility/2006">
+    <mc:Choice xmlns:p14="http://schemas.microsoft.com/office/powerpoint/2010/main" Requires="p14">
+      <p:transition spd="slow" p14:dur="1500">
+        <p:random/>
+      </p:transition>
+    </mc:Choice>
+    <mc:Fallback>
+      <p:transition spd="slow">
+        <p:random/>
+      </p:transition>
+    </mc:Fallback>
+  </mc:AlternateContent>
 </p:sld>
 </file>
 
-<file path=ppt/slides/slide14.xml><?xml version="1.0" encoding="utf-8"?>
+<file path=ppt/slides/slide16.xml><?xml version="1.0" encoding="utf-8"?>
 <p:sld xmlns:a="http://schemas.openxmlformats.org/drawingml/2006/main" xmlns:r="http://schemas.openxmlformats.org/officeDocument/2006/relationships" xmlns:p="http://schemas.openxmlformats.org/presentationml/2006/main">
   <p:cSld>
     <p:bg>
@@ -9536,6 +9884,103 @@
   <p:clrMapOvr>
     <a:masterClrMapping/>
   </p:clrMapOvr>
+  <mc:AlternateContent xmlns:mc="http://schemas.openxmlformats.org/markup-compatibility/2006">
+    <mc:Choice xmlns:p14="http://schemas.microsoft.com/office/powerpoint/2010/main" Requires="p14">
+      <p:transition spd="slow" p14:dur="1500">
+        <p:random/>
+      </p:transition>
+    </mc:Choice>
+    <mc:Fallback>
+      <p:transition spd="slow">
+        <p:random/>
+      </p:transition>
+    </mc:Fallback>
+  </mc:AlternateContent>
+</p:sld>
+</file>
+
+<file path=ppt/slides/slide17.xml><?xml version="1.0" encoding="utf-8"?>
+<p:sld xmlns:a="http://schemas.openxmlformats.org/drawingml/2006/main" xmlns:r="http://schemas.openxmlformats.org/officeDocument/2006/relationships" xmlns:p="http://schemas.openxmlformats.org/presentationml/2006/main">
+  <p:cSld>
+    <p:spTree>
+      <p:nvGrpSpPr>
+        <p:cNvPr id="1" name=""/>
+        <p:cNvGrpSpPr/>
+        <p:nvPr/>
+      </p:nvGrpSpPr>
+      <p:grpSpPr>
+        <a:xfrm>
+          <a:off x="0" y="0"/>
+          <a:ext cx="0" cy="0"/>
+          <a:chOff x="0" y="0"/>
+          <a:chExt cx="0" cy="0"/>
+        </a:xfrm>
+      </p:grpSpPr>
+      <p:sp>
+        <p:nvSpPr>
+          <p:cNvPr id="2" name="Title 1">
+            <a:extLst>
+              <a:ext uri="{FF2B5EF4-FFF2-40B4-BE49-F238E27FC236}">
+                <a16:creationId xmlns:a16="http://schemas.microsoft.com/office/drawing/2014/main" id="{E4E9A2F7-F963-EDFC-6ED5-80B1E3C823A0}"/>
+              </a:ext>
+            </a:extLst>
+          </p:cNvPr>
+          <p:cNvSpPr>
+            <a:spLocks noGrp="1"/>
+          </p:cNvSpPr>
+          <p:nvPr>
+            <p:ph type="title"/>
+          </p:nvPr>
+        </p:nvSpPr>
+        <p:spPr>
+          <a:xfrm>
+            <a:off x="5251895" y="2794910"/>
+            <a:ext cx="1694612" cy="1276802"/>
+          </a:xfrm>
+        </p:spPr>
+        <p:txBody>
+          <a:bodyPr vert="horz" wrap="square" lIns="0" tIns="0" rIns="0" bIns="0" rtlCol="0" anchor="t" anchorCtr="0">
+            <a:noAutofit/>
+          </a:bodyPr>
+          <a:lstStyle/>
+          <a:p>
+            <a:r>
+              <a:rPr lang="en-US" sz="8000" err="1">
+                <a:latin typeface="Blackadder ITC"/>
+              </a:rPr>
+              <a:t>el</a:t>
+            </a:r>
+            <a:r>
+              <a:rPr lang="en-US" sz="8000" dirty="0">
+                <a:latin typeface="Blackadder ITC"/>
+              </a:rPr>
+              <a:t> fin</a:t>
+            </a:r>
+          </a:p>
+        </p:txBody>
+      </p:sp>
+    </p:spTree>
+    <p:extLst>
+      <p:ext uri="{BB962C8B-B14F-4D97-AF65-F5344CB8AC3E}">
+        <p14:creationId xmlns:p14="http://schemas.microsoft.com/office/powerpoint/2010/main" val="3319498729"/>
+      </p:ext>
+    </p:extLst>
+  </p:cSld>
+  <p:clrMapOvr>
+    <a:masterClrMapping/>
+  </p:clrMapOvr>
+  <mc:AlternateContent xmlns:mc="http://schemas.openxmlformats.org/markup-compatibility/2006">
+    <mc:Choice xmlns:p14="http://schemas.microsoft.com/office/powerpoint/2010/main" Requires="p14">
+      <p:transition spd="slow" p14:dur="1500">
+        <p:random/>
+      </p:transition>
+    </mc:Choice>
+    <mc:Fallback>
+      <p:transition spd="slow">
+        <p:random/>
+      </p:transition>
+    </mc:Fallback>
+  </mc:AlternateContent>
 </p:sld>
 </file>
 
@@ -10813,6 +11258,18 @@
   <p:clrMapOvr>
     <a:masterClrMapping/>
   </p:clrMapOvr>
+  <mc:AlternateContent xmlns:mc="http://schemas.openxmlformats.org/markup-compatibility/2006">
+    <mc:Choice xmlns:p14="http://schemas.microsoft.com/office/powerpoint/2010/main" Requires="p14">
+      <p:transition spd="slow" p14:dur="1500">
+        <p:random/>
+      </p:transition>
+    </mc:Choice>
+    <mc:Fallback>
+      <p:transition spd="slow">
+        <p:random/>
+      </p:transition>
+    </mc:Fallback>
+  </mc:AlternateContent>
 </p:sld>
 </file>
 
@@ -12563,6 +13020,18 @@
   <p:clrMapOvr>
     <a:masterClrMapping/>
   </p:clrMapOvr>
+  <mc:AlternateContent xmlns:mc="http://schemas.openxmlformats.org/markup-compatibility/2006">
+    <mc:Choice xmlns:p14="http://schemas.microsoft.com/office/powerpoint/2010/main" Requires="p14">
+      <p:transition spd="slow" p14:dur="1500">
+        <p:random/>
+      </p:transition>
+    </mc:Choice>
+    <mc:Fallback>
+      <p:transition spd="slow">
+        <p:random/>
+      </p:transition>
+    </mc:Fallback>
+  </mc:AlternateContent>
 </p:sld>
 </file>
 
@@ -13587,6 +14056,18 @@
   <p:clrMapOvr>
     <a:masterClrMapping/>
   </p:clrMapOvr>
+  <mc:AlternateContent xmlns:mc="http://schemas.openxmlformats.org/markup-compatibility/2006">
+    <mc:Choice xmlns:p14="http://schemas.microsoft.com/office/powerpoint/2010/main" Requires="p14">
+      <p:transition spd="slow" p14:dur="1500">
+        <p:random/>
+      </p:transition>
+    </mc:Choice>
+    <mc:Fallback>
+      <p:transition spd="slow">
+        <p:random/>
+      </p:transition>
+    </mc:Fallback>
+  </mc:AlternateContent>
 </p:sld>
 </file>
 
@@ -15301,6 +15782,18 @@
   <p:clrMapOvr>
     <a:masterClrMapping/>
   </p:clrMapOvr>
+  <mc:AlternateContent xmlns:mc="http://schemas.openxmlformats.org/markup-compatibility/2006">
+    <mc:Choice xmlns:p14="http://schemas.microsoft.com/office/powerpoint/2010/main" Requires="p14">
+      <p:transition spd="slow" p14:dur="1500">
+        <p:random/>
+      </p:transition>
+    </mc:Choice>
+    <mc:Fallback>
+      <p:transition spd="slow">
+        <p:random/>
+      </p:transition>
+    </mc:Fallback>
+  </mc:AlternateContent>
 </p:sld>
 </file>
 
@@ -16296,6 +16789,18 @@
   <p:clrMapOvr>
     <a:masterClrMapping/>
   </p:clrMapOvr>
+  <mc:AlternateContent xmlns:mc="http://schemas.openxmlformats.org/markup-compatibility/2006">
+    <mc:Choice xmlns:p14="http://schemas.microsoft.com/office/powerpoint/2010/main" Requires="p14">
+      <p:transition spd="slow" p14:dur="1500">
+        <p:random/>
+      </p:transition>
+    </mc:Choice>
+    <mc:Fallback>
+      <p:transition spd="slow">
+        <p:random/>
+      </p:transition>
+    </mc:Fallback>
+  </mc:AlternateContent>
 </p:sld>
 </file>
 
@@ -17225,6 +17730,18 @@
   <p:clrMapOvr>
     <a:masterClrMapping/>
   </p:clrMapOvr>
+  <mc:AlternateContent xmlns:mc="http://schemas.openxmlformats.org/markup-compatibility/2006">
+    <mc:Choice xmlns:p14="http://schemas.microsoft.com/office/powerpoint/2010/main" Requires="p14">
+      <p:transition spd="slow" p14:dur="1500">
+        <p:random/>
+      </p:transition>
+    </mc:Choice>
+    <mc:Fallback>
+      <p:transition spd="slow">
+        <p:random/>
+      </p:transition>
+    </mc:Fallback>
+  </mc:AlternateContent>
 </p:sld>
 </file>
 
@@ -18122,6 +18639,18 @@
   <p:clrMapOvr>
     <a:masterClrMapping/>
   </p:clrMapOvr>
+  <mc:AlternateContent xmlns:mc="http://schemas.openxmlformats.org/markup-compatibility/2006">
+    <mc:Choice xmlns:p14="http://schemas.microsoft.com/office/powerpoint/2010/main" Requires="p14">
+      <p:transition spd="slow" p14:dur="1500">
+        <p:random/>
+      </p:transition>
+    </mc:Choice>
+    <mc:Fallback>
+      <p:transition spd="slow">
+        <p:random/>
+      </p:transition>
+    </mc:Fallback>
+  </mc:AlternateContent>
 </p:sld>
 </file>
 

</xml_diff>